<commit_message>
made composite (global, U, R) stairway plot figures; updated hierfstat
</commit_message>
<xml_diff>
--- a/misc/conceptual_figure_models.pptx
+++ b/misc/conceptual_figure_models.pptx
@@ -5,8 +5,8 @@
     <p:sldMasterId id="2147483648" r:id="rId1"/>
   </p:sldMasterIdLst>
   <p:sldIdLst>
-    <p:sldId id="256" r:id="rId2"/>
-    <p:sldId id="257" r:id="rId3"/>
+    <p:sldId id="257" r:id="rId2"/>
+    <p:sldId id="258" r:id="rId3"/>
   </p:sldIdLst>
   <p:sldSz cx="12192000" cy="6858000"/>
   <p:notesSz cx="6858000" cy="9144000"/>
@@ -105,6 +105,11 @@
       </a:defRPr>
     </a:lvl9pPr>
   </p:defaultTextStyle>
+  <p:extLst>
+    <p:ext uri="{EFAFB233-063F-42B5-8137-9DF3F51BA10A}">
+      <p15:sldGuideLst xmlns:p15="http://schemas.microsoft.com/office/powerpoint/2012/main"/>
+    </p:ext>
+  </p:extLst>
 </p:presentation>
 </file>
 
@@ -255,7 +260,7 @@
           <a:p>
             <a:fld id="{B042EB10-38FC-4CFB-BE3B-0ED143D637B9}" type="datetimeFigureOut">
               <a:rPr lang="en-US" smtClean="0"/>
-              <a:t>12/1/2023</a:t>
+              <a:t>12/6/2023</a:t>
             </a:fld>
             <a:endParaRPr lang="en-US"/>
           </a:p>
@@ -453,7 +458,7 @@
           <a:p>
             <a:fld id="{B042EB10-38FC-4CFB-BE3B-0ED143D637B9}" type="datetimeFigureOut">
               <a:rPr lang="en-US" smtClean="0"/>
-              <a:t>12/1/2023</a:t>
+              <a:t>12/6/2023</a:t>
             </a:fld>
             <a:endParaRPr lang="en-US"/>
           </a:p>
@@ -661,7 +666,7 @@
           <a:p>
             <a:fld id="{B042EB10-38FC-4CFB-BE3B-0ED143D637B9}" type="datetimeFigureOut">
               <a:rPr lang="en-US" smtClean="0"/>
-              <a:t>12/1/2023</a:t>
+              <a:t>12/6/2023</a:t>
             </a:fld>
             <a:endParaRPr lang="en-US"/>
           </a:p>
@@ -859,7 +864,7 @@
           <a:p>
             <a:fld id="{B042EB10-38FC-4CFB-BE3B-0ED143D637B9}" type="datetimeFigureOut">
               <a:rPr lang="en-US" smtClean="0"/>
-              <a:t>12/1/2023</a:t>
+              <a:t>12/6/2023</a:t>
             </a:fld>
             <a:endParaRPr lang="en-US"/>
           </a:p>
@@ -1134,7 +1139,7 @@
           <a:p>
             <a:fld id="{B042EB10-38FC-4CFB-BE3B-0ED143D637B9}" type="datetimeFigureOut">
               <a:rPr lang="en-US" smtClean="0"/>
-              <a:t>12/1/2023</a:t>
+              <a:t>12/6/2023</a:t>
             </a:fld>
             <a:endParaRPr lang="en-US"/>
           </a:p>
@@ -1399,7 +1404,7 @@
           <a:p>
             <a:fld id="{B042EB10-38FC-4CFB-BE3B-0ED143D637B9}" type="datetimeFigureOut">
               <a:rPr lang="en-US" smtClean="0"/>
-              <a:t>12/1/2023</a:t>
+              <a:t>12/6/2023</a:t>
             </a:fld>
             <a:endParaRPr lang="en-US"/>
           </a:p>
@@ -1811,7 +1816,7 @@
           <a:p>
             <a:fld id="{B042EB10-38FC-4CFB-BE3B-0ED143D637B9}" type="datetimeFigureOut">
               <a:rPr lang="en-US" smtClean="0"/>
-              <a:t>12/1/2023</a:t>
+              <a:t>12/6/2023</a:t>
             </a:fld>
             <a:endParaRPr lang="en-US"/>
           </a:p>
@@ -1952,7 +1957,7 @@
           <a:p>
             <a:fld id="{B042EB10-38FC-4CFB-BE3B-0ED143D637B9}" type="datetimeFigureOut">
               <a:rPr lang="en-US" smtClean="0"/>
-              <a:t>12/1/2023</a:t>
+              <a:t>12/6/2023</a:t>
             </a:fld>
             <a:endParaRPr lang="en-US"/>
           </a:p>
@@ -2065,7 +2070,7 @@
           <a:p>
             <a:fld id="{B042EB10-38FC-4CFB-BE3B-0ED143D637B9}" type="datetimeFigureOut">
               <a:rPr lang="en-US" smtClean="0"/>
-              <a:t>12/1/2023</a:t>
+              <a:t>12/6/2023</a:t>
             </a:fld>
             <a:endParaRPr lang="en-US"/>
           </a:p>
@@ -2376,7 +2381,7 @@
           <a:p>
             <a:fld id="{B042EB10-38FC-4CFB-BE3B-0ED143D637B9}" type="datetimeFigureOut">
               <a:rPr lang="en-US" smtClean="0"/>
-              <a:t>12/1/2023</a:t>
+              <a:t>12/6/2023</a:t>
             </a:fld>
             <a:endParaRPr lang="en-US"/>
           </a:p>
@@ -2664,7 +2669,7 @@
           <a:p>
             <a:fld id="{B042EB10-38FC-4CFB-BE3B-0ED143D637B9}" type="datetimeFigureOut">
               <a:rPr lang="en-US" smtClean="0"/>
-              <a:t>12/1/2023</a:t>
+              <a:t>12/6/2023</a:t>
             </a:fld>
             <a:endParaRPr lang="en-US"/>
           </a:p>
@@ -2905,7 +2910,7 @@
           <a:p>
             <a:fld id="{B042EB10-38FC-4CFB-BE3B-0ED143D637B9}" type="datetimeFigureOut">
               <a:rPr lang="en-US" smtClean="0"/>
-              <a:t>12/1/2023</a:t>
+              <a:t>12/6/2023</a:t>
             </a:fld>
             <a:endParaRPr lang="en-US"/>
           </a:p>
@@ -3322,417 +3327,1149 @@
           <a:chExt cx="0" cy="0"/>
         </a:xfrm>
       </p:grpSpPr>
-      <p:graphicFrame>
-        <p:nvGraphicFramePr>
-          <p:cNvPr id="7" name="Table 6">
-            <a:extLst>
-              <a:ext uri="{FF2B5EF4-FFF2-40B4-BE49-F238E27FC236}">
-                <a16:creationId xmlns:a16="http://schemas.microsoft.com/office/drawing/2014/main" id="{33C5D843-42F7-8840-038E-B172516CB3F6}"/>
-              </a:ext>
-            </a:extLst>
-          </p:cNvPr>
-          <p:cNvGraphicFramePr>
-            <a:graphicFrameLocks noGrp="1"/>
-          </p:cNvGraphicFramePr>
-          <p:nvPr>
-            <p:extLst>
-              <p:ext uri="{D42A27DB-BD31-4B8C-83A1-F6EECF244321}">
-                <p14:modId xmlns:p14="http://schemas.microsoft.com/office/powerpoint/2010/main" val="3415033625"/>
-              </p:ext>
-            </p:extLst>
-          </p:nvPr>
-        </p:nvGraphicFramePr>
-        <p:xfrm>
-          <a:off x="1253765" y="719666"/>
-          <a:ext cx="9653048" cy="5633999"/>
-        </p:xfrm>
-        <a:graphic>
-          <a:graphicData uri="http://schemas.openxmlformats.org/drawingml/2006/table">
-            <a:tbl>
-              <a:tblPr firstRow="1">
-                <a:tableStyleId>{5940675A-B579-460E-94D1-54222C63F5DA}</a:tableStyleId>
-              </a:tblPr>
-              <a:tblGrid>
-                <a:gridCol w="2413262">
-                  <a:extLst>
-                    <a:ext uri="{9D8B030D-6E8A-4147-A177-3AD203B41FA5}">
-                      <a16:colId xmlns:a16="http://schemas.microsoft.com/office/drawing/2014/main" val="4146195789"/>
-                    </a:ext>
-                  </a:extLst>
-                </a:gridCol>
-                <a:gridCol w="2413262">
-                  <a:extLst>
-                    <a:ext uri="{9D8B030D-6E8A-4147-A177-3AD203B41FA5}">
-                      <a16:colId xmlns:a16="http://schemas.microsoft.com/office/drawing/2014/main" val="2061575906"/>
-                    </a:ext>
-                  </a:extLst>
-                </a:gridCol>
-                <a:gridCol w="2413262">
-                  <a:extLst>
-                    <a:ext uri="{9D8B030D-6E8A-4147-A177-3AD203B41FA5}">
-                      <a16:colId xmlns:a16="http://schemas.microsoft.com/office/drawing/2014/main" val="3670537211"/>
-                    </a:ext>
-                  </a:extLst>
-                </a:gridCol>
-                <a:gridCol w="2413262">
-                  <a:extLst>
-                    <a:ext uri="{9D8B030D-6E8A-4147-A177-3AD203B41FA5}">
-                      <a16:colId xmlns:a16="http://schemas.microsoft.com/office/drawing/2014/main" val="707894234"/>
-                    </a:ext>
-                  </a:extLst>
-                </a:gridCol>
-              </a:tblGrid>
-              <a:tr h="2148559">
-                <a:tc>
-                  <a:txBody>
-                    <a:bodyPr/>
-                    <a:lstStyle/>
-                    <a:p>
-                      <a:pPr algn="ctr"/>
-                      <a:endParaRPr lang="en-US" dirty="0">
-                        <a:latin typeface="Arial" panose="020B0604020202020204" pitchFamily="34" charset="0"/>
-                        <a:cs typeface="Arial" panose="020B0604020202020204" pitchFamily="34" charset="0"/>
-                      </a:endParaRPr>
-                    </a:p>
-                  </a:txBody>
-                  <a:tcPr/>
-                </a:tc>
-                <a:tc>
-                  <a:txBody>
-                    <a:bodyPr/>
-                    <a:lstStyle/>
-                    <a:p>
-                      <a:pPr algn="ctr"/>
-                      <a:r>
-                        <a:rPr lang="en-US" dirty="0">
-                          <a:latin typeface="Arial" panose="020B0604020202020204" pitchFamily="34" charset="0"/>
-                          <a:cs typeface="Arial" panose="020B0604020202020204" pitchFamily="34" charset="0"/>
-                        </a:rPr>
-                        <a:t>Urban Fragmentation Model</a:t>
-                      </a:r>
-                    </a:p>
-                  </a:txBody>
-                  <a:tcPr/>
-                </a:tc>
-                <a:tc>
-                  <a:txBody>
-                    <a:bodyPr/>
-                    <a:lstStyle/>
-                    <a:p>
-                      <a:pPr algn="ctr"/>
-                      <a:r>
-                        <a:rPr lang="en-US" dirty="0">
-                          <a:latin typeface="Arial" panose="020B0604020202020204" pitchFamily="34" charset="0"/>
-                          <a:cs typeface="Arial" panose="020B0604020202020204" pitchFamily="34" charset="0"/>
-                        </a:rPr>
-                        <a:t>Urban Facilitation Model</a:t>
-                      </a:r>
-                    </a:p>
-                  </a:txBody>
-                  <a:tcPr/>
-                </a:tc>
-                <a:tc>
-                  <a:txBody>
-                    <a:bodyPr/>
-                    <a:lstStyle/>
-                    <a:p>
-                      <a:pPr algn="ctr"/>
-                      <a:r>
-                        <a:rPr lang="en-US" dirty="0">
-                          <a:latin typeface="Arial" panose="020B0604020202020204" pitchFamily="34" charset="0"/>
-                          <a:cs typeface="Arial" panose="020B0604020202020204" pitchFamily="34" charset="0"/>
-                        </a:rPr>
-                        <a:t>Null Model</a:t>
-                      </a:r>
-                    </a:p>
-                  </a:txBody>
-                  <a:tcPr/>
-                </a:tc>
+      <p:grpSp>
+        <p:nvGrpSpPr>
+          <p:cNvPr id="1025" name="Group 1024">
+            <a:extLst>
+              <a:ext uri="{FF2B5EF4-FFF2-40B4-BE49-F238E27FC236}">
+                <a16:creationId xmlns:a16="http://schemas.microsoft.com/office/drawing/2014/main" id="{E3CCA115-25CC-DB39-2C50-28DCBAF2D0D8}"/>
+              </a:ext>
+            </a:extLst>
+          </p:cNvPr>
+          <p:cNvGrpSpPr/>
+          <p:nvPr/>
+        </p:nvGrpSpPr>
+        <p:grpSpPr>
+          <a:xfrm>
+            <a:off x="6118315" y="2957909"/>
+            <a:ext cx="3685560" cy="1088311"/>
+            <a:chOff x="1208059" y="137743"/>
+            <a:chExt cx="3685560" cy="1088311"/>
+          </a:xfrm>
+        </p:grpSpPr>
+        <p:cxnSp>
+          <p:nvCxnSpPr>
+            <p:cNvPr id="18" name="Straight Connector 17">
+              <a:extLst>
+                <a:ext uri="{FF2B5EF4-FFF2-40B4-BE49-F238E27FC236}">
+                  <a16:creationId xmlns:a16="http://schemas.microsoft.com/office/drawing/2014/main" id="{F3051681-2E04-8228-C2E8-447D1BA82676}"/>
+                </a:ext>
+              </a:extLst>
+            </p:cNvPr>
+            <p:cNvCxnSpPr>
+              <a:cxnSpLocks/>
+            </p:cNvCxnSpPr>
+            <p:nvPr/>
+          </p:nvCxnSpPr>
+          <p:spPr>
+            <a:xfrm flipH="1">
+              <a:off x="1208060" y="378944"/>
+              <a:ext cx="1007239" cy="0"/>
+            </a:xfrm>
+            <a:prstGeom prst="line">
+              <a:avLst/>
+            </a:prstGeom>
+            <a:ln w="57150" cap="flat" cmpd="sng" algn="ctr">
+              <a:solidFill>
+                <a:srgbClr val="F48A20"/>
+              </a:solidFill>
+              <a:prstDash val="sysDash"/>
+              <a:round/>
+              <a:headEnd type="none" w="med" len="med"/>
+              <a:tailEnd type="none" w="med" len="med"/>
+            </a:ln>
+          </p:spPr>
+          <p:style>
+            <a:lnRef idx="0">
+              <a:scrgbClr r="0" g="0" b="0"/>
+            </a:lnRef>
+            <a:fillRef idx="0">
+              <a:scrgbClr r="0" g="0" b="0"/>
+            </a:fillRef>
+            <a:effectRef idx="0">
+              <a:scrgbClr r="0" g="0" b="0"/>
+            </a:effectRef>
+            <a:fontRef idx="minor">
+              <a:schemeClr val="tx1"/>
+            </a:fontRef>
+          </p:style>
+        </p:cxnSp>
+        <p:sp>
+          <p:nvSpPr>
+            <p:cNvPr id="21" name="TextBox 20">
+              <a:extLst>
+                <a:ext uri="{FF2B5EF4-FFF2-40B4-BE49-F238E27FC236}">
+                  <a16:creationId xmlns:a16="http://schemas.microsoft.com/office/drawing/2014/main" id="{1223A605-95AC-F207-28BF-06A2A6293AFD}"/>
+                </a:ext>
+              </a:extLst>
+            </p:cNvPr>
+            <p:cNvSpPr txBox="1"/>
+            <p:nvPr/>
+          </p:nvSpPr>
+          <p:spPr>
+            <a:xfrm>
+              <a:off x="2215298" y="137743"/>
+              <a:ext cx="2678321" cy="1088311"/>
+            </a:xfrm>
+            <a:prstGeom prst="rect">
+              <a:avLst/>
+            </a:prstGeom>
+            <a:noFill/>
+          </p:spPr>
+          <p:txBody>
+            <a:bodyPr wrap="square">
+              <a:spAutoFit/>
+            </a:bodyPr>
+            <a:lstStyle/>
+            <a:p>
+              <a:pPr>
+                <a:lnSpc>
+                  <a:spcPct val="150000"/>
+                </a:lnSpc>
+              </a:pPr>
+              <a:r>
+                <a:rPr lang="en-US" sz="1500" dirty="0">
+                  <a:latin typeface="Arial" panose="020B0604020202020204" pitchFamily="34" charset="0"/>
+                  <a:cs typeface="Arial" panose="020B0604020202020204" pitchFamily="34" charset="0"/>
+                </a:rPr>
+                <a:t>Urban fragmentation model</a:t>
+              </a:r>
+            </a:p>
+            <a:p>
+              <a:pPr>
+                <a:lnSpc>
+                  <a:spcPct val="150000"/>
+                </a:lnSpc>
+              </a:pPr>
+              <a:r>
+                <a:rPr lang="en-US" sz="1500" dirty="0">
+                  <a:latin typeface="Arial" panose="020B0604020202020204" pitchFamily="34" charset="0"/>
+                  <a:cs typeface="Arial" panose="020B0604020202020204" pitchFamily="34" charset="0"/>
+                </a:rPr>
+                <a:t>Urban facilitation model</a:t>
+              </a:r>
+            </a:p>
+            <a:p>
+              <a:pPr>
+                <a:lnSpc>
+                  <a:spcPct val="150000"/>
+                </a:lnSpc>
+              </a:pPr>
+              <a:r>
+                <a:rPr lang="en-US" sz="1500" dirty="0">
+                  <a:latin typeface="Arial" panose="020B0604020202020204" pitchFamily="34" charset="0"/>
+                  <a:cs typeface="Arial" panose="020B0604020202020204" pitchFamily="34" charset="0"/>
+                </a:rPr>
+                <a:t>Null model</a:t>
+              </a:r>
+            </a:p>
+          </p:txBody>
+        </p:sp>
+        <p:cxnSp>
+          <p:nvCxnSpPr>
+            <p:cNvPr id="22" name="Straight Connector 21">
+              <a:extLst>
+                <a:ext uri="{FF2B5EF4-FFF2-40B4-BE49-F238E27FC236}">
+                  <a16:creationId xmlns:a16="http://schemas.microsoft.com/office/drawing/2014/main" id="{8AE6DF54-A9A9-3332-4517-E0089D497CAC}"/>
+                </a:ext>
+              </a:extLst>
+            </p:cNvPr>
+            <p:cNvCxnSpPr>
+              <a:cxnSpLocks/>
+            </p:cNvCxnSpPr>
+            <p:nvPr/>
+          </p:nvCxnSpPr>
+          <p:spPr>
+            <a:xfrm flipH="1">
+              <a:off x="1208059" y="755592"/>
+              <a:ext cx="1007239" cy="0"/>
+            </a:xfrm>
+            <a:prstGeom prst="line">
+              <a:avLst/>
+            </a:prstGeom>
+            <a:ln w="57150" cap="flat" cmpd="sng" algn="ctr">
+              <a:solidFill>
+                <a:srgbClr val="37C5E7"/>
+              </a:solidFill>
+              <a:prstDash val="lgDash"/>
+              <a:round/>
+              <a:headEnd type="none" w="med" len="med"/>
+              <a:tailEnd type="none" w="med" len="med"/>
+            </a:ln>
+          </p:spPr>
+          <p:style>
+            <a:lnRef idx="0">
+              <a:scrgbClr r="0" g="0" b="0"/>
+            </a:lnRef>
+            <a:fillRef idx="0">
+              <a:scrgbClr r="0" g="0" b="0"/>
+            </a:fillRef>
+            <a:effectRef idx="0">
+              <a:scrgbClr r="0" g="0" b="0"/>
+            </a:effectRef>
+            <a:fontRef idx="minor">
+              <a:schemeClr val="tx1"/>
+            </a:fontRef>
+          </p:style>
+        </p:cxnSp>
+        <p:cxnSp>
+          <p:nvCxnSpPr>
+            <p:cNvPr id="28" name="Straight Connector 27">
+              <a:extLst>
+                <a:ext uri="{FF2B5EF4-FFF2-40B4-BE49-F238E27FC236}">
+                  <a16:creationId xmlns:a16="http://schemas.microsoft.com/office/drawing/2014/main" id="{EF434709-A440-9D5A-0350-1CA8BA854957}"/>
+                </a:ext>
+              </a:extLst>
+            </p:cNvPr>
+            <p:cNvCxnSpPr>
+              <a:cxnSpLocks/>
+            </p:cNvCxnSpPr>
+            <p:nvPr/>
+          </p:nvCxnSpPr>
+          <p:spPr>
+            <a:xfrm flipH="1">
+              <a:off x="1208059" y="1104781"/>
+              <a:ext cx="1007239" cy="0"/>
+            </a:xfrm>
+            <a:prstGeom prst="line">
+              <a:avLst/>
+            </a:prstGeom>
+            <a:ln w="57150" cap="flat" cmpd="sng" algn="ctr">
+              <a:solidFill>
+                <a:schemeClr val="tx1"/>
+              </a:solidFill>
+              <a:prstDash val="solid"/>
+              <a:round/>
+              <a:headEnd type="none" w="med" len="med"/>
+              <a:tailEnd type="none" w="med" len="med"/>
+            </a:ln>
+          </p:spPr>
+          <p:style>
+            <a:lnRef idx="0">
+              <a:scrgbClr r="0" g="0" b="0"/>
+            </a:lnRef>
+            <a:fillRef idx="0">
+              <a:scrgbClr r="0" g="0" b="0"/>
+            </a:fillRef>
+            <a:effectRef idx="0">
+              <a:scrgbClr r="0" g="0" b="0"/>
+            </a:effectRef>
+            <a:fontRef idx="minor">
+              <a:schemeClr val="tx1"/>
+            </a:fontRef>
+          </p:style>
+        </p:cxnSp>
+      </p:grpSp>
+      <p:grpSp>
+        <p:nvGrpSpPr>
+          <p:cNvPr id="1030" name="Group 1029">
+            <a:extLst>
+              <a:ext uri="{FF2B5EF4-FFF2-40B4-BE49-F238E27FC236}">
+                <a16:creationId xmlns:a16="http://schemas.microsoft.com/office/drawing/2014/main" id="{607DC410-3ED4-5E6E-2F21-52D6636E671B}"/>
+              </a:ext>
+            </a:extLst>
+          </p:cNvPr>
+          <p:cNvGrpSpPr/>
+          <p:nvPr/>
+        </p:nvGrpSpPr>
+        <p:grpSpPr>
+          <a:xfrm>
+            <a:off x="4321339" y="391042"/>
+            <a:ext cx="3311572" cy="2102595"/>
+            <a:chOff x="1769882" y="1998482"/>
+            <a:chExt cx="8096087" cy="4006393"/>
+          </a:xfrm>
+        </p:grpSpPr>
+        <p:sp>
+          <p:nvSpPr>
+            <p:cNvPr id="4" name="Rectangle 3">
+              <a:extLst>
+                <a:ext uri="{FF2B5EF4-FFF2-40B4-BE49-F238E27FC236}">
+                  <a16:creationId xmlns:a16="http://schemas.microsoft.com/office/drawing/2014/main" id="{A7772970-5043-56D3-521B-F4E596B28248}"/>
+                </a:ext>
+              </a:extLst>
+            </p:cNvPr>
+            <p:cNvSpPr/>
+            <p:nvPr/>
+          </p:nvSpPr>
+          <p:spPr>
+            <a:xfrm>
+              <a:off x="1809946" y="1998482"/>
+              <a:ext cx="8022211" cy="4006393"/>
+            </a:xfrm>
+            <a:prstGeom prst="rect">
+              <a:avLst/>
+            </a:prstGeom>
+            <a:noFill/>
+          </p:spPr>
+          <p:style>
+            <a:lnRef idx="2">
+              <a:schemeClr val="accent1">
+                <a:shade val="15000"/>
+              </a:schemeClr>
+            </a:lnRef>
+            <a:fillRef idx="1">
+              <a:schemeClr val="accent1"/>
+            </a:fillRef>
+            <a:effectRef idx="0">
+              <a:schemeClr val="accent1"/>
+            </a:effectRef>
+            <a:fontRef idx="minor">
+              <a:schemeClr val="lt1"/>
+            </a:fontRef>
+          </p:style>
+          <p:txBody>
+            <a:bodyPr rtlCol="0" anchor="ctr"/>
+            <a:lstStyle/>
+            <a:p>
+              <a:pPr algn="ctr"/>
+              <a:endParaRPr lang="en-US"/>
+            </a:p>
+          </p:txBody>
+        </p:sp>
+        <p:pic>
+          <p:nvPicPr>
+            <p:cNvPr id="1026" name="Picture 2">
+              <a:extLst>
+                <a:ext uri="{FF2B5EF4-FFF2-40B4-BE49-F238E27FC236}">
+                  <a16:creationId xmlns:a16="http://schemas.microsoft.com/office/drawing/2014/main" id="{3CCE8EFA-7155-3291-E44E-4AD85FEBC359}"/>
+                </a:ext>
+              </a:extLst>
+            </p:cNvPr>
+            <p:cNvPicPr>
+              <a:picLocks noChangeAspect="1" noChangeArrowheads="1"/>
+            </p:cNvPicPr>
+            <p:nvPr/>
+          </p:nvPicPr>
+          <p:blipFill>
+            <a:blip r:embed="rId2">
+              <a:alphaModFix amt="50000"/>
+              <a:extLst>
+                <a:ext uri="{28A0092B-C50C-407E-A947-70E740481C1C}">
+                  <a14:useLocalDpi xmlns:a14="http://schemas.microsoft.com/office/drawing/2010/main" val="0"/>
+                </a:ext>
+              </a:extLst>
+            </a:blip>
+            <a:srcRect/>
+            <a:stretch>
+              <a:fillRect/>
+            </a:stretch>
+          </p:blipFill>
+          <p:spPr bwMode="auto">
+            <a:xfrm>
+              <a:off x="1769882" y="5037231"/>
+              <a:ext cx="8096087" cy="967642"/>
+            </a:xfrm>
+            <a:prstGeom prst="rect">
+              <a:avLst/>
+            </a:prstGeom>
+            <a:noFill/>
+            <a:extLst>
+              <a:ext uri="{909E8E84-426E-40DD-AFC4-6F175D3DCCD1}">
+                <a14:hiddenFill xmlns:a14="http://schemas.microsoft.com/office/drawing/2010/main">
+                  <a:solidFill>
+                    <a:srgbClr val="FFFFFF"/>
+                  </a:solidFill>
+                </a14:hiddenFill>
+              </a:ext>
+            </a:extLst>
+          </p:spPr>
+        </p:pic>
+        <p:cxnSp>
+          <p:nvCxnSpPr>
+            <p:cNvPr id="8" name="Straight Connector 7">
+              <a:extLst>
+                <a:ext uri="{FF2B5EF4-FFF2-40B4-BE49-F238E27FC236}">
+                  <a16:creationId xmlns:a16="http://schemas.microsoft.com/office/drawing/2014/main" id="{A2FB0CA3-A6DE-B93C-1F8B-9A8EEEB7F23B}"/>
+                </a:ext>
+              </a:extLst>
+            </p:cNvPr>
+            <p:cNvCxnSpPr>
+              <a:cxnSpLocks/>
+            </p:cNvCxnSpPr>
+            <p:nvPr/>
+          </p:nvCxnSpPr>
+          <p:spPr>
+            <a:xfrm flipV="1">
+              <a:off x="1951348" y="2196445"/>
+              <a:ext cx="7777114" cy="2357986"/>
+            </a:xfrm>
+            <a:prstGeom prst="line">
+              <a:avLst/>
+            </a:prstGeom>
+            <a:ln w="57150" cap="flat" cmpd="sng" algn="ctr">
+              <a:solidFill>
+                <a:srgbClr val="37C5E7"/>
+              </a:solidFill>
+              <a:prstDash val="lgDash"/>
+              <a:round/>
+              <a:headEnd type="arrow" w="med" len="med"/>
+              <a:tailEnd type="arrow" w="med" len="med"/>
+            </a:ln>
+          </p:spPr>
+          <p:style>
+            <a:lnRef idx="0">
+              <a:scrgbClr r="0" g="0" b="0"/>
+            </a:lnRef>
+            <a:fillRef idx="0">
+              <a:scrgbClr r="0" g="0" b="0"/>
+            </a:fillRef>
+            <a:effectRef idx="0">
+              <a:scrgbClr r="0" g="0" b="0"/>
+            </a:effectRef>
+            <a:fontRef idx="minor">
+              <a:schemeClr val="tx1"/>
+            </a:fontRef>
+          </p:style>
+        </p:cxnSp>
+        <p:cxnSp>
+          <p:nvCxnSpPr>
+            <p:cNvPr id="9" name="Straight Connector 8">
+              <a:extLst>
+                <a:ext uri="{FF2B5EF4-FFF2-40B4-BE49-F238E27FC236}">
+                  <a16:creationId xmlns:a16="http://schemas.microsoft.com/office/drawing/2014/main" id="{DA194730-93A5-B09E-95B4-3C619089228A}"/>
+                </a:ext>
+              </a:extLst>
+            </p:cNvPr>
+            <p:cNvCxnSpPr>
+              <a:cxnSpLocks/>
+            </p:cNvCxnSpPr>
+            <p:nvPr/>
+          </p:nvCxnSpPr>
+          <p:spPr>
+            <a:xfrm flipH="1" flipV="1">
+              <a:off x="1971379" y="2196445"/>
+              <a:ext cx="7757083" cy="2357986"/>
+            </a:xfrm>
+            <a:prstGeom prst="line">
+              <a:avLst/>
+            </a:prstGeom>
+            <a:ln w="57150" cap="flat" cmpd="sng" algn="ctr">
+              <a:solidFill>
+                <a:srgbClr val="F48A20"/>
+              </a:solidFill>
+              <a:prstDash val="sysDash"/>
+              <a:round/>
+              <a:headEnd type="arrow" w="med" len="med"/>
+              <a:tailEnd type="arrow" w="med" len="med"/>
+            </a:ln>
+          </p:spPr>
+          <p:style>
+            <a:lnRef idx="0">
+              <a:scrgbClr r="0" g="0" b="0"/>
+            </a:lnRef>
+            <a:fillRef idx="0">
+              <a:scrgbClr r="0" g="0" b="0"/>
+            </a:fillRef>
+            <a:effectRef idx="0">
+              <a:scrgbClr r="0" g="0" b="0"/>
+            </a:effectRef>
+            <a:fontRef idx="minor">
+              <a:schemeClr val="tx1"/>
+            </a:fontRef>
+          </p:style>
+        </p:cxnSp>
+        <p:cxnSp>
+          <p:nvCxnSpPr>
+            <p:cNvPr id="30" name="Straight Connector 29">
+              <a:extLst>
+                <a:ext uri="{FF2B5EF4-FFF2-40B4-BE49-F238E27FC236}">
+                  <a16:creationId xmlns:a16="http://schemas.microsoft.com/office/drawing/2014/main" id="{3E8FF07B-188B-E45F-7C68-65BA2A93B268}"/>
+                </a:ext>
+              </a:extLst>
+            </p:cNvPr>
+            <p:cNvCxnSpPr>
+              <a:cxnSpLocks/>
+            </p:cNvCxnSpPr>
+            <p:nvPr/>
+          </p:nvCxnSpPr>
+          <p:spPr>
+            <a:xfrm flipH="1">
+              <a:off x="1951348" y="3358676"/>
+              <a:ext cx="7777114" cy="16762"/>
+            </a:xfrm>
+            <a:prstGeom prst="line">
+              <a:avLst/>
+            </a:prstGeom>
+            <a:ln w="57150" cap="flat" cmpd="sng" algn="ctr">
+              <a:solidFill>
+                <a:schemeClr val="tx1"/>
+              </a:solidFill>
+              <a:prstDash val="solid"/>
+              <a:round/>
+              <a:headEnd type="triangle" w="med" len="med"/>
+              <a:tailEnd type="triangle" w="med" len="med"/>
+            </a:ln>
+          </p:spPr>
+          <p:style>
+            <a:lnRef idx="0">
+              <a:scrgbClr r="0" g="0" b="0"/>
+            </a:lnRef>
+            <a:fillRef idx="0">
+              <a:scrgbClr r="0" g="0" b="0"/>
+            </a:fillRef>
+            <a:effectRef idx="0">
+              <a:scrgbClr r="0" g="0" b="0"/>
+            </a:effectRef>
+            <a:fontRef idx="minor">
+              <a:schemeClr val="tx1"/>
+            </a:fontRef>
+          </p:style>
+        </p:cxnSp>
+      </p:grpSp>
+      <p:grpSp>
+        <p:nvGrpSpPr>
+          <p:cNvPr id="1032" name="Group 1031">
+            <a:extLst>
+              <a:ext uri="{FF2B5EF4-FFF2-40B4-BE49-F238E27FC236}">
+                <a16:creationId xmlns:a16="http://schemas.microsoft.com/office/drawing/2014/main" id="{0AC97422-1395-B3D9-7F8C-55FEFD620ED7}"/>
+              </a:ext>
+            </a:extLst>
+          </p:cNvPr>
+          <p:cNvGrpSpPr/>
+          <p:nvPr/>
+        </p:nvGrpSpPr>
+        <p:grpSpPr>
+          <a:xfrm>
+            <a:off x="8488622" y="31119"/>
+            <a:ext cx="3311572" cy="2466875"/>
+            <a:chOff x="1769883" y="2982723"/>
+            <a:chExt cx="4056985" cy="3022152"/>
+          </a:xfrm>
+        </p:grpSpPr>
+        <p:sp>
+          <p:nvSpPr>
+            <p:cNvPr id="1033" name="TextBox 1032">
+              <a:extLst>
+                <a:ext uri="{FF2B5EF4-FFF2-40B4-BE49-F238E27FC236}">
+                  <a16:creationId xmlns:a16="http://schemas.microsoft.com/office/drawing/2014/main" id="{6F16D7BB-9BE7-AA1A-2A82-3102F004C927}"/>
+                </a:ext>
+              </a:extLst>
+            </p:cNvPr>
+            <p:cNvSpPr txBox="1"/>
+            <p:nvPr/>
+          </p:nvSpPr>
+          <p:spPr>
+            <a:xfrm>
+              <a:off x="1788392" y="2982723"/>
+              <a:ext cx="4019965" cy="490172"/>
+            </a:xfrm>
+            <a:prstGeom prst="rect">
+              <a:avLst/>
+            </a:prstGeom>
+            <a:noFill/>
+          </p:spPr>
+          <p:txBody>
+            <a:bodyPr wrap="square">
+              <a:spAutoFit/>
+            </a:bodyPr>
+            <a:lstStyle/>
+            <a:p>
+              <a:pPr algn="ctr"/>
+              <a:endParaRPr lang="en-US" sz="2000" dirty="0">
+                <a:latin typeface="Arial" panose="020B0604020202020204" pitchFamily="34" charset="0"/>
+                <a:cs typeface="Arial" panose="020B0604020202020204" pitchFamily="34" charset="0"/>
+              </a:endParaRPr>
+            </a:p>
+          </p:txBody>
+        </p:sp>
+        <p:grpSp>
+          <p:nvGrpSpPr>
+            <p:cNvPr id="1034" name="Group 1033">
+              <a:extLst>
+                <a:ext uri="{FF2B5EF4-FFF2-40B4-BE49-F238E27FC236}">
+                  <a16:creationId xmlns:a16="http://schemas.microsoft.com/office/drawing/2014/main" id="{F0F3532F-9C98-393A-9E9F-3A738E2875DF}"/>
+                </a:ext>
+              </a:extLst>
+            </p:cNvPr>
+            <p:cNvGrpSpPr/>
+            <p:nvPr/>
+          </p:nvGrpSpPr>
+          <p:grpSpPr>
+            <a:xfrm>
+              <a:off x="1769883" y="3429000"/>
+              <a:ext cx="4056985" cy="2575875"/>
+              <a:chOff x="1769882" y="1998482"/>
+              <a:chExt cx="8096087" cy="4006393"/>
+            </a:xfrm>
+          </p:grpSpPr>
+          <p:sp>
+            <p:nvSpPr>
+              <p:cNvPr id="1035" name="Rectangle 1034">
                 <a:extLst>
-                  <a:ext uri="{0D108BD9-81ED-4DB2-BD59-A6C34878D82A}">
-                    <a16:rowId xmlns:a16="http://schemas.microsoft.com/office/drawing/2014/main" val="1423908229"/>
+                  <a:ext uri="{FF2B5EF4-FFF2-40B4-BE49-F238E27FC236}">
+                    <a16:creationId xmlns:a16="http://schemas.microsoft.com/office/drawing/2014/main" id="{969A9920-4417-04D9-3F43-885F88133383}"/>
                   </a:ext>
                 </a:extLst>
-              </a:tr>
-              <a:tr h="871360">
-                <a:tc>
-                  <a:txBody>
-                    <a:bodyPr/>
-                    <a:lstStyle/>
-                    <a:p>
-                      <a:r>
-                        <a:rPr lang="en-US" dirty="0">
-                          <a:latin typeface="Arial" panose="020B0604020202020204" pitchFamily="34" charset="0"/>
-                          <a:cs typeface="Arial" panose="020B0604020202020204" pitchFamily="34" charset="0"/>
-                        </a:rPr>
-                        <a:t>Genetic diversity</a:t>
-                      </a:r>
-                    </a:p>
-                  </a:txBody>
-                  <a:tcPr/>
-                </a:tc>
-                <a:tc>
-                  <a:txBody>
-                    <a:bodyPr/>
-                    <a:lstStyle/>
-                    <a:p>
-                      <a:endParaRPr lang="en-US" dirty="0">
-                        <a:latin typeface="Arial" panose="020B0604020202020204" pitchFamily="34" charset="0"/>
-                        <a:cs typeface="Arial" panose="020B0604020202020204" pitchFamily="34" charset="0"/>
-                      </a:endParaRPr>
-                    </a:p>
-                  </a:txBody>
-                  <a:tcPr/>
-                </a:tc>
-                <a:tc>
-                  <a:txBody>
-                    <a:bodyPr/>
-                    <a:lstStyle/>
-                    <a:p>
-                      <a:endParaRPr lang="en-US" dirty="0">
-                        <a:latin typeface="Arial" panose="020B0604020202020204" pitchFamily="34" charset="0"/>
-                        <a:cs typeface="Arial" panose="020B0604020202020204" pitchFamily="34" charset="0"/>
-                      </a:endParaRPr>
-                    </a:p>
-                  </a:txBody>
-                  <a:tcPr/>
-                </a:tc>
-                <a:tc>
-                  <a:txBody>
-                    <a:bodyPr/>
-                    <a:lstStyle/>
-                    <a:p>
-                      <a:endParaRPr lang="en-US">
-                        <a:latin typeface="Arial" panose="020B0604020202020204" pitchFamily="34" charset="0"/>
-                        <a:cs typeface="Arial" panose="020B0604020202020204" pitchFamily="34" charset="0"/>
-                      </a:endParaRPr>
-                    </a:p>
-                  </a:txBody>
-                  <a:tcPr/>
-                </a:tc>
+              </p:cNvPr>
+              <p:cNvSpPr/>
+              <p:nvPr/>
+            </p:nvSpPr>
+            <p:spPr>
+              <a:xfrm>
+                <a:off x="1809946" y="1998482"/>
+                <a:ext cx="8022211" cy="4006393"/>
+              </a:xfrm>
+              <a:prstGeom prst="rect">
+                <a:avLst/>
+              </a:prstGeom>
+              <a:noFill/>
+            </p:spPr>
+            <p:style>
+              <a:lnRef idx="2">
+                <a:schemeClr val="accent1">
+                  <a:shade val="15000"/>
+                </a:schemeClr>
+              </a:lnRef>
+              <a:fillRef idx="1">
+                <a:schemeClr val="accent1"/>
+              </a:fillRef>
+              <a:effectRef idx="0">
+                <a:schemeClr val="accent1"/>
+              </a:effectRef>
+              <a:fontRef idx="minor">
+                <a:schemeClr val="lt1"/>
+              </a:fontRef>
+            </p:style>
+            <p:txBody>
+              <a:bodyPr rtlCol="0" anchor="ctr"/>
+              <a:lstStyle/>
+              <a:p>
+                <a:pPr algn="ctr"/>
+                <a:endParaRPr lang="en-US"/>
+              </a:p>
+            </p:txBody>
+          </p:sp>
+          <p:pic>
+            <p:nvPicPr>
+              <p:cNvPr id="1036" name="Picture 2">
                 <a:extLst>
-                  <a:ext uri="{0D108BD9-81ED-4DB2-BD59-A6C34878D82A}">
-                    <a16:rowId xmlns:a16="http://schemas.microsoft.com/office/drawing/2014/main" val="3138233649"/>
+                  <a:ext uri="{FF2B5EF4-FFF2-40B4-BE49-F238E27FC236}">
+                    <a16:creationId xmlns:a16="http://schemas.microsoft.com/office/drawing/2014/main" id="{DCAB5B4A-0CF6-1F41-2484-2A3D02FA56DC}"/>
                   </a:ext>
                 </a:extLst>
-              </a:tr>
-              <a:tr h="871360">
-                <a:tc>
-                  <a:txBody>
-                    <a:bodyPr/>
-                    <a:lstStyle/>
-                    <a:p>
-                      <a:r>
-                        <a:rPr lang="en-US" dirty="0">
-                          <a:latin typeface="Arial" panose="020B0604020202020204" pitchFamily="34" charset="0"/>
-                          <a:cs typeface="Arial" panose="020B0604020202020204" pitchFamily="34" charset="0"/>
-                        </a:rPr>
-                        <a:t>Effective population size</a:t>
-                      </a:r>
-                    </a:p>
-                  </a:txBody>
-                  <a:tcPr/>
-                </a:tc>
-                <a:tc>
-                  <a:txBody>
-                    <a:bodyPr/>
-                    <a:lstStyle/>
-                    <a:p>
-                      <a:endParaRPr lang="en-US" dirty="0">
-                        <a:latin typeface="Arial" panose="020B0604020202020204" pitchFamily="34" charset="0"/>
-                        <a:cs typeface="Arial" panose="020B0604020202020204" pitchFamily="34" charset="0"/>
-                      </a:endParaRPr>
-                    </a:p>
-                  </a:txBody>
-                  <a:tcPr/>
-                </a:tc>
-                <a:tc>
-                  <a:txBody>
-                    <a:bodyPr/>
-                    <a:lstStyle/>
-                    <a:p>
-                      <a:endParaRPr lang="en-US" dirty="0">
-                        <a:latin typeface="Arial" panose="020B0604020202020204" pitchFamily="34" charset="0"/>
-                        <a:cs typeface="Arial" panose="020B0604020202020204" pitchFamily="34" charset="0"/>
-                      </a:endParaRPr>
-                    </a:p>
-                  </a:txBody>
-                  <a:tcPr/>
-                </a:tc>
-                <a:tc>
-                  <a:txBody>
-                    <a:bodyPr/>
-                    <a:lstStyle/>
-                    <a:p>
-                      <a:endParaRPr lang="en-US">
-                        <a:latin typeface="Arial" panose="020B0604020202020204" pitchFamily="34" charset="0"/>
-                        <a:cs typeface="Arial" panose="020B0604020202020204" pitchFamily="34" charset="0"/>
-                      </a:endParaRPr>
-                    </a:p>
-                  </a:txBody>
-                  <a:tcPr/>
-                </a:tc>
+              </p:cNvPr>
+              <p:cNvPicPr>
+                <a:picLocks noChangeAspect="1" noChangeArrowheads="1"/>
+              </p:cNvPicPr>
+              <p:nvPr/>
+            </p:nvPicPr>
+            <p:blipFill>
+              <a:blip r:embed="rId2">
+                <a:alphaModFix amt="50000"/>
                 <a:extLst>
-                  <a:ext uri="{0D108BD9-81ED-4DB2-BD59-A6C34878D82A}">
-                    <a16:rowId xmlns:a16="http://schemas.microsoft.com/office/drawing/2014/main" val="2907854452"/>
+                  <a:ext uri="{28A0092B-C50C-407E-A947-70E740481C1C}">
+                    <a14:useLocalDpi xmlns:a14="http://schemas.microsoft.com/office/drawing/2010/main" val="0"/>
                   </a:ext>
                 </a:extLst>
-              </a:tr>
-              <a:tr h="871360">
-                <a:tc>
-                  <a:txBody>
-                    <a:bodyPr/>
-                    <a:lstStyle/>
-                    <a:p>
-                      <a:pPr marL="0" marR="0" lvl="0" indent="0" algn="l" defTabSz="914400" rtl="0" eaLnBrk="1" fontAlgn="auto" latinLnBrk="0" hangingPunct="1">
-                        <a:lnSpc>
-                          <a:spcPct val="100000"/>
-                        </a:lnSpc>
-                        <a:spcBef>
-                          <a:spcPts val="0"/>
-                        </a:spcBef>
-                        <a:spcAft>
-                          <a:spcPts val="0"/>
-                        </a:spcAft>
-                        <a:buClrTx/>
-                        <a:buSzTx/>
-                        <a:buFontTx/>
-                        <a:buNone/>
-                        <a:tabLst/>
-                        <a:defRPr/>
-                      </a:pPr>
-                      <a:r>
-                        <a:rPr lang="en-US" dirty="0">
-                          <a:latin typeface="Arial" panose="020B0604020202020204" pitchFamily="34" charset="0"/>
-                          <a:cs typeface="Arial" panose="020B0604020202020204" pitchFamily="34" charset="0"/>
-                        </a:rPr>
-                        <a:t>Genetic differentiation</a:t>
-                      </a:r>
-                    </a:p>
-                    <a:p>
-                      <a:endParaRPr lang="en-US" dirty="0">
-                        <a:latin typeface="Arial" panose="020B0604020202020204" pitchFamily="34" charset="0"/>
-                        <a:cs typeface="Arial" panose="020B0604020202020204" pitchFamily="34" charset="0"/>
-                      </a:endParaRPr>
-                    </a:p>
-                  </a:txBody>
-                  <a:tcPr/>
-                </a:tc>
-                <a:tc>
-                  <a:txBody>
-                    <a:bodyPr/>
-                    <a:lstStyle/>
-                    <a:p>
-                      <a:endParaRPr lang="en-US" dirty="0">
-                        <a:latin typeface="Arial" panose="020B0604020202020204" pitchFamily="34" charset="0"/>
-                        <a:cs typeface="Arial" panose="020B0604020202020204" pitchFamily="34" charset="0"/>
-                      </a:endParaRPr>
-                    </a:p>
-                  </a:txBody>
-                  <a:tcPr/>
-                </a:tc>
-                <a:tc>
-                  <a:txBody>
-                    <a:bodyPr/>
-                    <a:lstStyle/>
-                    <a:p>
-                      <a:endParaRPr lang="en-US" dirty="0">
-                        <a:latin typeface="Arial" panose="020B0604020202020204" pitchFamily="34" charset="0"/>
-                        <a:cs typeface="Arial" panose="020B0604020202020204" pitchFamily="34" charset="0"/>
-                      </a:endParaRPr>
-                    </a:p>
-                  </a:txBody>
-                  <a:tcPr/>
-                </a:tc>
-                <a:tc>
-                  <a:txBody>
-                    <a:bodyPr/>
-                    <a:lstStyle/>
-                    <a:p>
-                      <a:endParaRPr lang="en-US" dirty="0">
-                        <a:latin typeface="Arial" panose="020B0604020202020204" pitchFamily="34" charset="0"/>
-                        <a:cs typeface="Arial" panose="020B0604020202020204" pitchFamily="34" charset="0"/>
-                      </a:endParaRPr>
-                    </a:p>
-                  </a:txBody>
-                  <a:tcPr/>
-                </a:tc>
+              </a:blip>
+              <a:srcRect/>
+              <a:stretch>
+                <a:fillRect/>
+              </a:stretch>
+            </p:blipFill>
+            <p:spPr bwMode="auto">
+              <a:xfrm>
+                <a:off x="1769882" y="5037231"/>
+                <a:ext cx="8096087" cy="967642"/>
+              </a:xfrm>
+              <a:prstGeom prst="rect">
+                <a:avLst/>
+              </a:prstGeom>
+              <a:noFill/>
+              <a:extLst>
+                <a:ext uri="{909E8E84-426E-40DD-AFC4-6F175D3DCCD1}">
+                  <a14:hiddenFill xmlns:a14="http://schemas.microsoft.com/office/drawing/2010/main">
+                    <a:solidFill>
+                      <a:srgbClr val="FFFFFF"/>
+                    </a:solidFill>
+                  </a14:hiddenFill>
+                </a:ext>
+              </a:extLst>
+            </p:spPr>
+          </p:pic>
+          <p:cxnSp>
+            <p:nvCxnSpPr>
+              <p:cNvPr id="1037" name="Straight Connector 1036">
                 <a:extLst>
-                  <a:ext uri="{0D108BD9-81ED-4DB2-BD59-A6C34878D82A}">
-                    <a16:rowId xmlns:a16="http://schemas.microsoft.com/office/drawing/2014/main" val="834495418"/>
+                  <a:ext uri="{FF2B5EF4-FFF2-40B4-BE49-F238E27FC236}">
+                    <a16:creationId xmlns:a16="http://schemas.microsoft.com/office/drawing/2014/main" id="{6E312F7D-5366-AB31-CC94-647335B93D2D}"/>
                   </a:ext>
                 </a:extLst>
-              </a:tr>
-              <a:tr h="871360">
-                <a:tc>
-                  <a:txBody>
-                    <a:bodyPr/>
-                    <a:lstStyle/>
-                    <a:p>
-                      <a:r>
-                        <a:rPr lang="en-US" dirty="0">
-                          <a:latin typeface="Arial" panose="020B0604020202020204" pitchFamily="34" charset="0"/>
-                          <a:cs typeface="Arial" panose="020B0604020202020204" pitchFamily="34" charset="0"/>
-                        </a:rPr>
-                        <a:t>Spatial genetic structure</a:t>
-                      </a:r>
-                    </a:p>
-                  </a:txBody>
-                  <a:tcPr/>
-                </a:tc>
-                <a:tc>
-                  <a:txBody>
-                    <a:bodyPr/>
-                    <a:lstStyle/>
-                    <a:p>
-                      <a:endParaRPr lang="en-US" dirty="0">
-                        <a:latin typeface="Arial" panose="020B0604020202020204" pitchFamily="34" charset="0"/>
-                        <a:cs typeface="Arial" panose="020B0604020202020204" pitchFamily="34" charset="0"/>
-                      </a:endParaRPr>
-                    </a:p>
-                  </a:txBody>
-                  <a:tcPr/>
-                </a:tc>
-                <a:tc>
-                  <a:txBody>
-                    <a:bodyPr/>
-                    <a:lstStyle/>
-                    <a:p>
-                      <a:endParaRPr lang="en-US">
-                        <a:latin typeface="Arial" panose="020B0604020202020204" pitchFamily="34" charset="0"/>
-                        <a:cs typeface="Arial" panose="020B0604020202020204" pitchFamily="34" charset="0"/>
-                      </a:endParaRPr>
-                    </a:p>
-                  </a:txBody>
-                  <a:tcPr/>
-                </a:tc>
-                <a:tc>
-                  <a:txBody>
-                    <a:bodyPr/>
-                    <a:lstStyle/>
-                    <a:p>
-                      <a:endParaRPr lang="en-US" dirty="0">
-                        <a:latin typeface="Arial" panose="020B0604020202020204" pitchFamily="34" charset="0"/>
-                        <a:cs typeface="Arial" panose="020B0604020202020204" pitchFamily="34" charset="0"/>
-                      </a:endParaRPr>
-                    </a:p>
-                  </a:txBody>
-                  <a:tcPr/>
-                </a:tc>
+              </p:cNvPr>
+              <p:cNvCxnSpPr>
+                <a:cxnSpLocks/>
+              </p:cNvCxnSpPr>
+              <p:nvPr/>
+            </p:nvCxnSpPr>
+            <p:spPr>
+              <a:xfrm>
+                <a:off x="1951347" y="2196446"/>
+                <a:ext cx="7777114" cy="2357986"/>
+              </a:xfrm>
+              <a:prstGeom prst="line">
+                <a:avLst/>
+              </a:prstGeom>
+              <a:ln w="57150" cap="flat" cmpd="sng" algn="ctr">
+                <a:solidFill>
+                  <a:srgbClr val="37C5E7"/>
+                </a:solidFill>
+                <a:prstDash val="lgDash"/>
+                <a:round/>
+                <a:headEnd type="arrow" w="med" len="med"/>
+                <a:tailEnd type="arrow" w="med" len="med"/>
+              </a:ln>
+            </p:spPr>
+            <p:style>
+              <a:lnRef idx="0">
+                <a:scrgbClr r="0" g="0" b="0"/>
+              </a:lnRef>
+              <a:fillRef idx="0">
+                <a:scrgbClr r="0" g="0" b="0"/>
+              </a:fillRef>
+              <a:effectRef idx="0">
+                <a:scrgbClr r="0" g="0" b="0"/>
+              </a:effectRef>
+              <a:fontRef idx="minor">
+                <a:schemeClr val="tx1"/>
+              </a:fontRef>
+            </p:style>
+          </p:cxnSp>
+          <p:cxnSp>
+            <p:nvCxnSpPr>
+              <p:cNvPr id="1038" name="Straight Connector 1037">
                 <a:extLst>
-                  <a:ext uri="{0D108BD9-81ED-4DB2-BD59-A6C34878D82A}">
-                    <a16:rowId xmlns:a16="http://schemas.microsoft.com/office/drawing/2014/main" val="2740682801"/>
+                  <a:ext uri="{FF2B5EF4-FFF2-40B4-BE49-F238E27FC236}">
+                    <a16:creationId xmlns:a16="http://schemas.microsoft.com/office/drawing/2014/main" id="{15FC564B-CBA5-B283-41A2-E215346E50B0}"/>
                   </a:ext>
                 </a:extLst>
-              </a:tr>
-            </a:tbl>
-          </a:graphicData>
-        </a:graphic>
-      </p:graphicFrame>
+              </p:cNvPr>
+              <p:cNvCxnSpPr>
+                <a:cxnSpLocks/>
+              </p:cNvCxnSpPr>
+              <p:nvPr/>
+            </p:nvCxnSpPr>
+            <p:spPr>
+              <a:xfrm flipH="1">
+                <a:off x="1971379" y="2196446"/>
+                <a:ext cx="7757084" cy="2357986"/>
+              </a:xfrm>
+              <a:prstGeom prst="line">
+                <a:avLst/>
+              </a:prstGeom>
+              <a:ln w="57150" cap="flat" cmpd="sng" algn="ctr">
+                <a:solidFill>
+                  <a:srgbClr val="F48A20"/>
+                </a:solidFill>
+                <a:prstDash val="sysDash"/>
+                <a:round/>
+                <a:headEnd type="arrow" w="med" len="med"/>
+                <a:tailEnd type="arrow" w="med" len="med"/>
+              </a:ln>
+            </p:spPr>
+            <p:style>
+              <a:lnRef idx="0">
+                <a:scrgbClr r="0" g="0" b="0"/>
+              </a:lnRef>
+              <a:fillRef idx="0">
+                <a:scrgbClr r="0" g="0" b="0"/>
+              </a:fillRef>
+              <a:effectRef idx="0">
+                <a:scrgbClr r="0" g="0" b="0"/>
+              </a:effectRef>
+              <a:fontRef idx="minor">
+                <a:schemeClr val="tx1"/>
+              </a:fontRef>
+            </p:style>
+          </p:cxnSp>
+          <p:cxnSp>
+            <p:nvCxnSpPr>
+              <p:cNvPr id="1039" name="Straight Connector 1038">
+                <a:extLst>
+                  <a:ext uri="{FF2B5EF4-FFF2-40B4-BE49-F238E27FC236}">
+                    <a16:creationId xmlns:a16="http://schemas.microsoft.com/office/drawing/2014/main" id="{CF6AFC84-6DE8-3780-B43F-8A510114EBE5}"/>
+                  </a:ext>
+                </a:extLst>
+              </p:cNvPr>
+              <p:cNvCxnSpPr>
+                <a:cxnSpLocks/>
+              </p:cNvCxnSpPr>
+              <p:nvPr/>
+            </p:nvCxnSpPr>
+            <p:spPr>
+              <a:xfrm flipH="1">
+                <a:off x="1951348" y="3358676"/>
+                <a:ext cx="7777114" cy="16762"/>
+              </a:xfrm>
+              <a:prstGeom prst="line">
+                <a:avLst/>
+              </a:prstGeom>
+              <a:ln w="57150" cap="flat" cmpd="sng" algn="ctr">
+                <a:solidFill>
+                  <a:schemeClr val="tx1"/>
+                </a:solidFill>
+                <a:prstDash val="solid"/>
+                <a:round/>
+                <a:headEnd type="triangle" w="med" len="med"/>
+                <a:tailEnd type="triangle" w="med" len="med"/>
+              </a:ln>
+            </p:spPr>
+            <p:style>
+              <a:lnRef idx="0">
+                <a:scrgbClr r="0" g="0" b="0"/>
+              </a:lnRef>
+              <a:fillRef idx="0">
+                <a:scrgbClr r="0" g="0" b="0"/>
+              </a:fillRef>
+              <a:effectRef idx="0">
+                <a:scrgbClr r="0" g="0" b="0"/>
+              </a:effectRef>
+              <a:fontRef idx="minor">
+                <a:schemeClr val="tx1"/>
+              </a:fontRef>
+            </p:style>
+          </p:cxnSp>
+        </p:grpSp>
+      </p:grpSp>
+      <p:sp>
+        <p:nvSpPr>
+          <p:cNvPr id="16" name="TextBox 15">
+            <a:extLst>
+              <a:ext uri="{FF2B5EF4-FFF2-40B4-BE49-F238E27FC236}">
+                <a16:creationId xmlns:a16="http://schemas.microsoft.com/office/drawing/2014/main" id="{4614AF72-530C-DA81-5C85-BE6F24D84C37}"/>
+              </a:ext>
+            </a:extLst>
+          </p:cNvPr>
+          <p:cNvSpPr txBox="1"/>
+          <p:nvPr/>
+        </p:nvSpPr>
+        <p:spPr>
+          <a:xfrm>
+            <a:off x="4377248" y="2498755"/>
+            <a:ext cx="3255664" cy="338554"/>
+          </a:xfrm>
+          <a:prstGeom prst="rect">
+            <a:avLst/>
+          </a:prstGeom>
+          <a:noFill/>
+        </p:spPr>
+        <p:txBody>
+          <a:bodyPr wrap="square">
+            <a:spAutoFit/>
+          </a:bodyPr>
+          <a:lstStyle/>
+          <a:p>
+            <a:pPr algn="ctr"/>
+            <a:r>
+              <a:rPr lang="en-US" sz="1600" i="1" dirty="0">
+                <a:latin typeface="Arial" panose="020B0604020202020204" pitchFamily="34" charset="0"/>
+                <a:cs typeface="Arial" panose="020B0604020202020204" pitchFamily="34" charset="0"/>
+              </a:rPr>
+              <a:t>Low        </a:t>
+            </a:r>
+            <a:r>
+              <a:rPr lang="en-US" sz="1600" dirty="0">
+                <a:latin typeface="Arial" panose="020B0604020202020204" pitchFamily="34" charset="0"/>
+                <a:cs typeface="Arial" panose="020B0604020202020204" pitchFamily="34" charset="0"/>
+              </a:rPr>
+              <a:t>Urbanization        </a:t>
+            </a:r>
+            <a:r>
+              <a:rPr lang="en-US" sz="1600" i="1" dirty="0">
+                <a:latin typeface="Arial" panose="020B0604020202020204" pitchFamily="34" charset="0"/>
+                <a:cs typeface="Arial" panose="020B0604020202020204" pitchFamily="34" charset="0"/>
+              </a:rPr>
+              <a:t>High</a:t>
+            </a:r>
+            <a:endParaRPr lang="en-US" sz="1600" dirty="0"/>
+          </a:p>
+        </p:txBody>
+      </p:sp>
+      <p:sp>
+        <p:nvSpPr>
+          <p:cNvPr id="19" name="TextBox 18">
+            <a:extLst>
+              <a:ext uri="{FF2B5EF4-FFF2-40B4-BE49-F238E27FC236}">
+                <a16:creationId xmlns:a16="http://schemas.microsoft.com/office/drawing/2014/main" id="{46AF5E7A-579F-F723-D308-ED979D30A03D}"/>
+              </a:ext>
+            </a:extLst>
+          </p:cNvPr>
+          <p:cNvSpPr txBox="1"/>
+          <p:nvPr/>
+        </p:nvSpPr>
+        <p:spPr>
+          <a:xfrm rot="16200000">
+            <a:off x="2686849" y="1214081"/>
+            <a:ext cx="2731416" cy="584775"/>
+          </a:xfrm>
+          <a:prstGeom prst="rect">
+            <a:avLst/>
+          </a:prstGeom>
+          <a:noFill/>
+        </p:spPr>
+        <p:txBody>
+          <a:bodyPr wrap="square">
+            <a:spAutoFit/>
+          </a:bodyPr>
+          <a:lstStyle/>
+          <a:p>
+            <a:pPr algn="ctr"/>
+            <a:r>
+              <a:rPr lang="en-US" sz="1600" dirty="0">
+                <a:latin typeface="Arial" panose="020B0604020202020204" pitchFamily="34" charset="0"/>
+                <a:cs typeface="Arial" panose="020B0604020202020204" pitchFamily="34" charset="0"/>
+              </a:rPr>
+              <a:t>Genetic diversity</a:t>
+            </a:r>
+          </a:p>
+          <a:p>
+            <a:pPr algn="ctr"/>
+            <a:r>
+              <a:rPr lang="en-US" sz="1600" dirty="0">
+                <a:latin typeface="Arial" panose="020B0604020202020204" pitchFamily="34" charset="0"/>
+                <a:cs typeface="Arial" panose="020B0604020202020204" pitchFamily="34" charset="0"/>
+              </a:rPr>
+              <a:t>Effective population size</a:t>
+            </a:r>
+            <a:endParaRPr lang="en-US" sz="1600" dirty="0"/>
+          </a:p>
+        </p:txBody>
+      </p:sp>
+      <p:sp>
+        <p:nvSpPr>
+          <p:cNvPr id="23" name="TextBox 22">
+            <a:extLst>
+              <a:ext uri="{FF2B5EF4-FFF2-40B4-BE49-F238E27FC236}">
+                <a16:creationId xmlns:a16="http://schemas.microsoft.com/office/drawing/2014/main" id="{926E5541-8278-BC70-527C-D79E97DDB8B3}"/>
+              </a:ext>
+            </a:extLst>
+          </p:cNvPr>
+          <p:cNvSpPr txBox="1"/>
+          <p:nvPr/>
+        </p:nvSpPr>
+        <p:spPr>
+          <a:xfrm rot="16200000">
+            <a:off x="6702304" y="1273062"/>
+            <a:ext cx="3153408" cy="338554"/>
+          </a:xfrm>
+          <a:prstGeom prst="rect">
+            <a:avLst/>
+          </a:prstGeom>
+          <a:noFill/>
+        </p:spPr>
+        <p:txBody>
+          <a:bodyPr wrap="square">
+            <a:spAutoFit/>
+          </a:bodyPr>
+          <a:lstStyle>
+            <a:defPPr>
+              <a:defRPr lang="en-US"/>
+            </a:defPPr>
+            <a:lvl1pPr algn="ctr">
+              <a:defRPr sz="1600">
+                <a:latin typeface="Arial" panose="020B0604020202020204" pitchFamily="34" charset="0"/>
+                <a:cs typeface="Arial" panose="020B0604020202020204" pitchFamily="34" charset="0"/>
+              </a:defRPr>
+            </a:lvl1pPr>
+          </a:lstStyle>
+          <a:p>
+            <a:r>
+              <a:rPr lang="en-US" dirty="0"/>
+              <a:t>Genetic differentiation</a:t>
+            </a:r>
+          </a:p>
+        </p:txBody>
+      </p:sp>
+      <p:sp>
+        <p:nvSpPr>
+          <p:cNvPr id="24" name="Rectangle 23">
+            <a:extLst>
+              <a:ext uri="{FF2B5EF4-FFF2-40B4-BE49-F238E27FC236}">
+                <a16:creationId xmlns:a16="http://schemas.microsoft.com/office/drawing/2014/main" id="{DD19D888-D2D0-E3FB-F363-6E20670DF7D6}"/>
+              </a:ext>
+            </a:extLst>
+          </p:cNvPr>
+          <p:cNvSpPr/>
+          <p:nvPr/>
+        </p:nvSpPr>
+        <p:spPr>
+          <a:xfrm>
+            <a:off x="3619893" y="-11742"/>
+            <a:ext cx="8505656" cy="4225524"/>
+          </a:xfrm>
+          <a:prstGeom prst="rect">
+            <a:avLst/>
+          </a:prstGeom>
+          <a:noFill/>
+          <a:ln>
+            <a:solidFill>
+              <a:schemeClr val="bg1"/>
+            </a:solidFill>
+          </a:ln>
+        </p:spPr>
+        <p:style>
+          <a:lnRef idx="2">
+            <a:schemeClr val="accent1">
+              <a:shade val="15000"/>
+            </a:schemeClr>
+          </a:lnRef>
+          <a:fillRef idx="1">
+            <a:schemeClr val="accent1"/>
+          </a:fillRef>
+          <a:effectRef idx="0">
+            <a:schemeClr val="accent1"/>
+          </a:effectRef>
+          <a:fontRef idx="minor">
+            <a:schemeClr val="lt1"/>
+          </a:fontRef>
+        </p:style>
+        <p:txBody>
+          <a:bodyPr rtlCol="0" anchor="ctr"/>
+          <a:lstStyle/>
+          <a:p>
+            <a:pPr algn="ctr"/>
+            <a:endParaRPr lang="en-US"/>
+          </a:p>
+        </p:txBody>
+      </p:sp>
+      <p:sp>
+        <p:nvSpPr>
+          <p:cNvPr id="26" name="TextBox 25">
+            <a:extLst>
+              <a:ext uri="{FF2B5EF4-FFF2-40B4-BE49-F238E27FC236}">
+                <a16:creationId xmlns:a16="http://schemas.microsoft.com/office/drawing/2014/main" id="{6ABCC45F-A591-5E67-0CD5-227663A82BFE}"/>
+              </a:ext>
+            </a:extLst>
+          </p:cNvPr>
+          <p:cNvSpPr txBox="1"/>
+          <p:nvPr/>
+        </p:nvSpPr>
+        <p:spPr>
+          <a:xfrm>
+            <a:off x="3653127" y="140760"/>
+            <a:ext cx="519878" cy="400110"/>
+          </a:xfrm>
+          <a:prstGeom prst="rect">
+            <a:avLst/>
+          </a:prstGeom>
+          <a:noFill/>
+        </p:spPr>
+        <p:txBody>
+          <a:bodyPr wrap="square">
+            <a:spAutoFit/>
+          </a:bodyPr>
+          <a:lstStyle/>
+          <a:p>
+            <a:pPr algn="ctr"/>
+            <a:r>
+              <a:rPr lang="en-US" sz="2000" b="1" dirty="0">
+                <a:latin typeface="Arial" panose="020B0604020202020204" pitchFamily="34" charset="0"/>
+                <a:cs typeface="Arial" panose="020B0604020202020204" pitchFamily="34" charset="0"/>
+              </a:rPr>
+              <a:t>A</a:t>
+            </a:r>
+            <a:endParaRPr lang="en-US" sz="2000" b="1" dirty="0"/>
+          </a:p>
+        </p:txBody>
+      </p:sp>
+      <p:sp>
+        <p:nvSpPr>
+          <p:cNvPr id="27" name="TextBox 26">
+            <a:extLst>
+              <a:ext uri="{FF2B5EF4-FFF2-40B4-BE49-F238E27FC236}">
+                <a16:creationId xmlns:a16="http://schemas.microsoft.com/office/drawing/2014/main" id="{426C3367-64CD-BE64-E953-679A39208CE3}"/>
+              </a:ext>
+            </a:extLst>
+          </p:cNvPr>
+          <p:cNvSpPr txBox="1"/>
+          <p:nvPr/>
+        </p:nvSpPr>
+        <p:spPr>
+          <a:xfrm>
+            <a:off x="7793067" y="140760"/>
+            <a:ext cx="519878" cy="400110"/>
+          </a:xfrm>
+          <a:prstGeom prst="rect">
+            <a:avLst/>
+          </a:prstGeom>
+          <a:noFill/>
+        </p:spPr>
+        <p:txBody>
+          <a:bodyPr wrap="square">
+            <a:spAutoFit/>
+          </a:bodyPr>
+          <a:lstStyle/>
+          <a:p>
+            <a:pPr algn="ctr"/>
+            <a:r>
+              <a:rPr lang="en-US" sz="2000" b="1" dirty="0">
+                <a:latin typeface="Arial" panose="020B0604020202020204" pitchFamily="34" charset="0"/>
+                <a:cs typeface="Arial" panose="020B0604020202020204" pitchFamily="34" charset="0"/>
+              </a:rPr>
+              <a:t>B</a:t>
+            </a:r>
+            <a:endParaRPr lang="en-US" sz="2000" b="1" dirty="0"/>
+          </a:p>
+        </p:txBody>
+      </p:sp>
+      <p:sp>
+        <p:nvSpPr>
+          <p:cNvPr id="29" name="TextBox 28">
+            <a:extLst>
+              <a:ext uri="{FF2B5EF4-FFF2-40B4-BE49-F238E27FC236}">
+                <a16:creationId xmlns:a16="http://schemas.microsoft.com/office/drawing/2014/main" id="{EF4CABF5-6719-08CA-B9E6-ACB5369BE4D9}"/>
+              </a:ext>
+            </a:extLst>
+          </p:cNvPr>
+          <p:cNvSpPr txBox="1"/>
+          <p:nvPr/>
+        </p:nvSpPr>
+        <p:spPr>
+          <a:xfrm>
+            <a:off x="8516575" y="2493636"/>
+            <a:ext cx="3255664" cy="338554"/>
+          </a:xfrm>
+          <a:prstGeom prst="rect">
+            <a:avLst/>
+          </a:prstGeom>
+          <a:noFill/>
+        </p:spPr>
+        <p:txBody>
+          <a:bodyPr wrap="square">
+            <a:spAutoFit/>
+          </a:bodyPr>
+          <a:lstStyle/>
+          <a:p>
+            <a:pPr algn="ctr"/>
+            <a:r>
+              <a:rPr lang="en-US" sz="1600" i="1" dirty="0">
+                <a:latin typeface="Arial" panose="020B0604020202020204" pitchFamily="34" charset="0"/>
+                <a:cs typeface="Arial" panose="020B0604020202020204" pitchFamily="34" charset="0"/>
+              </a:rPr>
+              <a:t>Low        </a:t>
+            </a:r>
+            <a:r>
+              <a:rPr lang="en-US" sz="1600" dirty="0">
+                <a:latin typeface="Arial" panose="020B0604020202020204" pitchFamily="34" charset="0"/>
+                <a:cs typeface="Arial" panose="020B0604020202020204" pitchFamily="34" charset="0"/>
+              </a:rPr>
+              <a:t>Urbanization        </a:t>
+            </a:r>
+            <a:r>
+              <a:rPr lang="en-US" sz="1600" i="1" dirty="0">
+                <a:latin typeface="Arial" panose="020B0604020202020204" pitchFamily="34" charset="0"/>
+                <a:cs typeface="Arial" panose="020B0604020202020204" pitchFamily="34" charset="0"/>
+              </a:rPr>
+              <a:t>High</a:t>
+            </a:r>
+            <a:endParaRPr lang="en-US" sz="1600" dirty="0"/>
+          </a:p>
+        </p:txBody>
+      </p:sp>
     </p:spTree>
     <p:extLst>
       <p:ext uri="{BB962C8B-B14F-4D97-AF65-F5344CB8AC3E}">
-        <p14:creationId xmlns:p14="http://schemas.microsoft.com/office/powerpoint/2010/main" val="1520337850"/>
+        <p14:creationId xmlns:p14="http://schemas.microsoft.com/office/powerpoint/2010/main" val="2082067710"/>
       </p:ext>
     </p:extLst>
   </p:cSld>
@@ -6523,7 +7260,7 @@
     </p:spTree>
     <p:extLst>
       <p:ext uri="{BB962C8B-B14F-4D97-AF65-F5344CB8AC3E}">
-        <p14:creationId xmlns:p14="http://schemas.microsoft.com/office/powerpoint/2010/main" val="2082067710"/>
+        <p14:creationId xmlns:p14="http://schemas.microsoft.com/office/powerpoint/2010/main" val="3877623852"/>
       </p:ext>
     </p:extLst>
   </p:cSld>

</xml_diff>

<commit_message>
updating Ne script/breakpoint table; plus updating readmes
</commit_message>
<xml_diff>
--- a/misc/conceptual_figure_models.pptx
+++ b/misc/conceptual_figure_models.pptx
@@ -260,7 +260,7 @@
           <a:p>
             <a:fld id="{B042EB10-38FC-4CFB-BE3B-0ED143D637B9}" type="datetimeFigureOut">
               <a:rPr lang="en-US" smtClean="0"/>
-              <a:t>12/6/2023</a:t>
+              <a:t>6/3/2024</a:t>
             </a:fld>
             <a:endParaRPr lang="en-US"/>
           </a:p>
@@ -458,7 +458,7 @@
           <a:p>
             <a:fld id="{B042EB10-38FC-4CFB-BE3B-0ED143D637B9}" type="datetimeFigureOut">
               <a:rPr lang="en-US" smtClean="0"/>
-              <a:t>12/6/2023</a:t>
+              <a:t>6/3/2024</a:t>
             </a:fld>
             <a:endParaRPr lang="en-US"/>
           </a:p>
@@ -666,7 +666,7 @@
           <a:p>
             <a:fld id="{B042EB10-38FC-4CFB-BE3B-0ED143D637B9}" type="datetimeFigureOut">
               <a:rPr lang="en-US" smtClean="0"/>
-              <a:t>12/6/2023</a:t>
+              <a:t>6/3/2024</a:t>
             </a:fld>
             <a:endParaRPr lang="en-US"/>
           </a:p>
@@ -864,7 +864,7 @@
           <a:p>
             <a:fld id="{B042EB10-38FC-4CFB-BE3B-0ED143D637B9}" type="datetimeFigureOut">
               <a:rPr lang="en-US" smtClean="0"/>
-              <a:t>12/6/2023</a:t>
+              <a:t>6/3/2024</a:t>
             </a:fld>
             <a:endParaRPr lang="en-US"/>
           </a:p>
@@ -1139,7 +1139,7 @@
           <a:p>
             <a:fld id="{B042EB10-38FC-4CFB-BE3B-0ED143D637B9}" type="datetimeFigureOut">
               <a:rPr lang="en-US" smtClean="0"/>
-              <a:t>12/6/2023</a:t>
+              <a:t>6/3/2024</a:t>
             </a:fld>
             <a:endParaRPr lang="en-US"/>
           </a:p>
@@ -1404,7 +1404,7 @@
           <a:p>
             <a:fld id="{B042EB10-38FC-4CFB-BE3B-0ED143D637B9}" type="datetimeFigureOut">
               <a:rPr lang="en-US" smtClean="0"/>
-              <a:t>12/6/2023</a:t>
+              <a:t>6/3/2024</a:t>
             </a:fld>
             <a:endParaRPr lang="en-US"/>
           </a:p>
@@ -1816,7 +1816,7 @@
           <a:p>
             <a:fld id="{B042EB10-38FC-4CFB-BE3B-0ED143D637B9}" type="datetimeFigureOut">
               <a:rPr lang="en-US" smtClean="0"/>
-              <a:t>12/6/2023</a:t>
+              <a:t>6/3/2024</a:t>
             </a:fld>
             <a:endParaRPr lang="en-US"/>
           </a:p>
@@ -1957,7 +1957,7 @@
           <a:p>
             <a:fld id="{B042EB10-38FC-4CFB-BE3B-0ED143D637B9}" type="datetimeFigureOut">
               <a:rPr lang="en-US" smtClean="0"/>
-              <a:t>12/6/2023</a:t>
+              <a:t>6/3/2024</a:t>
             </a:fld>
             <a:endParaRPr lang="en-US"/>
           </a:p>
@@ -2070,7 +2070,7 @@
           <a:p>
             <a:fld id="{B042EB10-38FC-4CFB-BE3B-0ED143D637B9}" type="datetimeFigureOut">
               <a:rPr lang="en-US" smtClean="0"/>
-              <a:t>12/6/2023</a:t>
+              <a:t>6/3/2024</a:t>
             </a:fld>
             <a:endParaRPr lang="en-US"/>
           </a:p>
@@ -2381,7 +2381,7 @@
           <a:p>
             <a:fld id="{B042EB10-38FC-4CFB-BE3B-0ED143D637B9}" type="datetimeFigureOut">
               <a:rPr lang="en-US" smtClean="0"/>
-              <a:t>12/6/2023</a:t>
+              <a:t>6/3/2024</a:t>
             </a:fld>
             <a:endParaRPr lang="en-US"/>
           </a:p>
@@ -2669,7 +2669,7 @@
           <a:p>
             <a:fld id="{B042EB10-38FC-4CFB-BE3B-0ED143D637B9}" type="datetimeFigureOut">
               <a:rPr lang="en-US" smtClean="0"/>
-              <a:t>12/6/2023</a:t>
+              <a:t>6/3/2024</a:t>
             </a:fld>
             <a:endParaRPr lang="en-US"/>
           </a:p>
@@ -2910,7 +2910,7 @@
           <a:p>
             <a:fld id="{B042EB10-38FC-4CFB-BE3B-0ED143D637B9}" type="datetimeFigureOut">
               <a:rPr lang="en-US" smtClean="0"/>
-              <a:t>12/6/2023</a:t>
+              <a:t>6/3/2024</a:t>
             </a:fld>
             <a:endParaRPr lang="en-US"/>
           </a:p>
@@ -3460,7 +3460,7 @@
                   <a:latin typeface="Arial" panose="020B0604020202020204" pitchFamily="34" charset="0"/>
                   <a:cs typeface="Arial" panose="020B0604020202020204" pitchFamily="34" charset="0"/>
                 </a:rPr>
-                <a:t>Null model</a:t>
+                <a:t>Classic null model</a:t>
               </a:r>
             </a:p>
           </p:txBody>

</xml_diff>